<commit_message>
mods on pptfig and readme
</commit_message>
<xml_diff>
--- a/vignettes/Output_L_ledger.pptx
+++ b/vignettes/Output_L_ledger.pptx
@@ -3565,8 +3565,7 @@
                 <a:ea typeface="Arial"/>
                 <a:sym typeface="Arial"/>
               </a:rPr>
-              <a:t>An Empty Plot
-</a:t>
+              <a:t>An Empty Plot</a:t>
             </a:r>
             <a:r>
               <a:rPr cap="none" sz="900" i="0" b="0" u="none">
@@ -3580,8 +3579,8 @@
                 <a:ea typeface="Arial"/>
                 <a:sym typeface="Arial"/>
               </a:rPr>
-              <a:t>Project Description 1
-</a:t>
+              <a:t>
+Project Description 1</a:t>
             </a:r>
             <a:r>
               <a:rPr cap="none" sz="900" i="0" b="0" u="none">
@@ -3595,7 +3594,8 @@
                 <a:ea typeface="Arial"/>
                 <a:sym typeface="Arial"/>
               </a:rPr>
-              <a:t>Project Description 2</a:t>
+              <a:t>
+Project Description 2</a:t>
             </a:r>
           </a:p>
         </p:txBody>

</xml_diff>

<commit_message>
Revert "Merging Katherine's working branch to main"
</commit_message>
<xml_diff>
--- a/vignettes/Output_L_ledger.pptx
+++ b/vignettes/Output_L_ledger.pptx
@@ -3565,7 +3565,8 @@
                 <a:ea typeface="Arial"/>
                 <a:sym typeface="Arial"/>
               </a:rPr>
-              <a:t>An Empty Plot</a:t>
+              <a:t>An Empty Plot
+</a:t>
             </a:r>
             <a:r>
               <a:rPr cap="none" sz="900" i="0" b="0" u="none">
@@ -3579,8 +3580,8 @@
                 <a:ea typeface="Arial"/>
                 <a:sym typeface="Arial"/>
               </a:rPr>
-              <a:t>
-Project Description 1</a:t>
+              <a:t>Project Description 1
+</a:t>
             </a:r>
             <a:r>
               <a:rPr cap="none" sz="900" i="0" b="0" u="none">
@@ -3594,8 +3595,7 @@
                 <a:ea typeface="Arial"/>
                 <a:sym typeface="Arial"/>
               </a:rPr>
-              <a:t>
-Project Description 2</a:t>
+              <a:t>Project Description 2</a:t>
             </a:r>
           </a:p>
         </p:txBody>

</xml_diff>